<commit_message>
Slides finalizados para a apresentação.
</commit_message>
<xml_diff>
--- a/tinkercad/slides.pptx
+++ b/tinkercad/slides.pptx
@@ -5,7 +5,7 @@
     <p:sldMasterId id="2147483648" r:id="rId1"/>
   </p:sldMasterIdLst>
   <p:notesMasterIdLst>
-    <p:notesMasterId r:id="rId30"/>
+    <p:notesMasterId r:id="rId32"/>
   </p:notesMasterIdLst>
   <p:sldIdLst>
     <p:sldId id="256" r:id="rId2"/>
@@ -28,14 +28,16 @@
     <p:sldId id="315" r:id="rId19"/>
     <p:sldId id="318" r:id="rId20"/>
     <p:sldId id="319" r:id="rId21"/>
-    <p:sldId id="321" r:id="rId22"/>
-    <p:sldId id="322" r:id="rId23"/>
-    <p:sldId id="324" r:id="rId24"/>
-    <p:sldId id="323" r:id="rId25"/>
-    <p:sldId id="325" r:id="rId26"/>
-    <p:sldId id="326" r:id="rId27"/>
-    <p:sldId id="268" r:id="rId28"/>
-    <p:sldId id="328" r:id="rId29"/>
+    <p:sldId id="331" r:id="rId22"/>
+    <p:sldId id="321" r:id="rId23"/>
+    <p:sldId id="322" r:id="rId24"/>
+    <p:sldId id="324" r:id="rId25"/>
+    <p:sldId id="323" r:id="rId26"/>
+    <p:sldId id="325" r:id="rId27"/>
+    <p:sldId id="332" r:id="rId28"/>
+    <p:sldId id="326" r:id="rId29"/>
+    <p:sldId id="268" r:id="rId30"/>
+    <p:sldId id="333" r:id="rId31"/>
   </p:sldIdLst>
   <p:sldSz cx="9144000" cy="6858000" type="screen4x3"/>
   <p:notesSz cx="6858000" cy="9144000"/>
@@ -3629,68 +3631,59 @@
             <p:ph type="ctrTitle"/>
           </p:nvPr>
         </p:nvSpPr>
-        <p:spPr/>
+        <p:spPr>
+          <a:xfrm>
+            <a:off x="685800" y="2693988"/>
+            <a:ext cx="7772400" cy="1470025"/>
+          </a:xfrm>
+        </p:spPr>
         <p:txBody>
           <a:bodyPr/>
           <a:lstStyle/>
           <a:p>
             <a:r>
-              <a:rPr lang="en-US" dirty="0" err="1" smtClean="0">
+              <a:rPr lang="en-US" b="1" dirty="0" err="1" smtClean="0">
                 <a:latin typeface="Museo 100 Regular"/>
                 <a:cs typeface="Museo 100 Regular"/>
               </a:rPr>
               <a:t>Simulação</a:t>
             </a:r>
             <a:r>
-              <a:rPr lang="en-US" dirty="0" smtClean="0">
+              <a:rPr lang="en-US" b="1" dirty="0" smtClean="0">
                 <a:latin typeface="Museo 100 Regular"/>
                 <a:cs typeface="Museo 100 Regular"/>
               </a:rPr>
               <a:t> de </a:t>
             </a:r>
             <a:r>
-              <a:rPr lang="en-US" dirty="0" err="1" smtClean="0">
-                <a:latin typeface="Museo 100 Regular"/>
-                <a:cs typeface="Museo 100 Regular"/>
-              </a:rPr>
-              <a:t>circu</a:t>
-            </a:r>
-            <a:r>
-              <a:rPr lang="en-US" dirty="0" err="1" smtClean="0">
-                <a:latin typeface="Museo 100 Regular"/>
-                <a:cs typeface="Museo 100 Regular"/>
-              </a:rPr>
-              <a:t>í</a:t>
-            </a:r>
-            <a:r>
-              <a:rPr lang="en-US" dirty="0" err="1" smtClean="0">
-                <a:latin typeface="Museo 100 Regular"/>
-                <a:cs typeface="Museo 100 Regular"/>
-              </a:rPr>
-              <a:t>tos</a:t>
-            </a:r>
-            <a:r>
-              <a:rPr lang="en-US" dirty="0" smtClean="0">
+              <a:rPr lang="en-US" b="1" dirty="0" err="1" smtClean="0">
+                <a:latin typeface="Museo 100 Regular"/>
+                <a:cs typeface="Museo 100 Regular"/>
+              </a:rPr>
+              <a:t>circuitos</a:t>
+            </a:r>
+            <a:r>
+              <a:rPr lang="en-US" b="1" dirty="0" smtClean="0">
                 <a:latin typeface="Museo 100 Regular"/>
                 <a:cs typeface="Museo 100 Regular"/>
               </a:rPr>
               <a:t> </a:t>
             </a:r>
             <a:r>
-              <a:rPr lang="en-US" dirty="0" smtClean="0">
+              <a:rPr lang="en-US" b="1" dirty="0" smtClean="0">
                 <a:latin typeface="Museo 100 Regular"/>
                 <a:cs typeface="Museo 100 Regular"/>
               </a:rPr>
               <a:t>com </a:t>
             </a:r>
             <a:r>
-              <a:rPr lang="en-US" dirty="0" err="1" smtClean="0">
+              <a:rPr lang="en-US" b="1" dirty="0" err="1" smtClean="0">
                 <a:latin typeface="Museo 100 Regular"/>
                 <a:cs typeface="Museo 100 Regular"/>
               </a:rPr>
               <a:t>Tinkercad</a:t>
             </a:r>
-            <a:endParaRPr lang="en-US" dirty="0">
+            <a:endParaRPr lang="en-US" b="1" dirty="0">
               <a:latin typeface="Museo 100 Regular"/>
               <a:cs typeface="Museo 100 Regular"/>
             </a:endParaRPr>
@@ -3709,7 +3702,7 @@
         </p:nvSpPr>
         <p:spPr>
           <a:xfrm>
-            <a:off x="1371600" y="3976915"/>
+            <a:off x="1371600" y="4598725"/>
             <a:ext cx="6400800" cy="1752600"/>
           </a:xfrm>
         </p:spPr>
@@ -3720,54 +3713,54 @@
           <a:lstStyle/>
           <a:p>
             <a:r>
-              <a:rPr lang="en-US" dirty="0" smtClean="0">
+              <a:rPr lang="en-US" b="1" dirty="0" smtClean="0">
                 <a:latin typeface="Museo 100 Regular"/>
                 <a:cs typeface="Museo 100 Regular"/>
               </a:rPr>
               <a:t>Felipe </a:t>
             </a:r>
             <a:r>
-              <a:rPr lang="en-US" dirty="0" err="1" smtClean="0">
+              <a:rPr lang="en-US" b="1" dirty="0" err="1" smtClean="0">
                 <a:latin typeface="Museo 100 Regular"/>
                 <a:cs typeface="Museo 100 Regular"/>
               </a:rPr>
               <a:t>Kühne</a:t>
             </a:r>
-            <a:endParaRPr lang="en-US" dirty="0" smtClean="0">
+            <a:endParaRPr lang="en-US" b="1" dirty="0" smtClean="0">
               <a:latin typeface="Museo 100 Regular"/>
               <a:cs typeface="Museo 100 Regular"/>
             </a:endParaRPr>
           </a:p>
           <a:p>
             <a:r>
-              <a:rPr lang="en-US" dirty="0" smtClean="0">
+              <a:rPr lang="en-US" b="1" dirty="0" smtClean="0">
                 <a:latin typeface="Museo 100 Regular"/>
                 <a:cs typeface="Museo 100 Regular"/>
                 <a:hlinkClick r:id="rId2"/>
               </a:rPr>
               <a:t>fkuhne@pucrs.br</a:t>
             </a:r>
-            <a:endParaRPr lang="en-US" dirty="0" smtClean="0">
+            <a:endParaRPr lang="en-US" b="1" dirty="0" smtClean="0">
               <a:latin typeface="Museo 100 Regular"/>
               <a:cs typeface="Museo 100 Regular"/>
             </a:endParaRPr>
           </a:p>
           <a:p>
-            <a:endParaRPr lang="en-US" dirty="0">
+            <a:endParaRPr lang="en-US" b="1" dirty="0">
               <a:latin typeface="Museo 100 Regular"/>
               <a:cs typeface="Museo 100 Regular"/>
             </a:endParaRPr>
           </a:p>
           <a:p>
             <a:r>
-              <a:rPr lang="en-US" dirty="0" err="1" smtClean="0">
+              <a:rPr lang="en-US" b="1" dirty="0" err="1" smtClean="0">
                 <a:latin typeface="Museo 100 Regular"/>
                 <a:cs typeface="Museo 100 Regular"/>
               </a:rPr>
               <a:t>Março</a:t>
             </a:r>
             <a:r>
-              <a:rPr lang="en-US" dirty="0" smtClean="0">
+              <a:rPr lang="en-US" b="1" dirty="0" smtClean="0">
                 <a:latin typeface="Museo 100 Regular"/>
                 <a:cs typeface="Museo 100 Regular"/>
               </a:rPr>
@@ -3775,7 +3768,7 @@
             </a:r>
           </a:p>
           <a:p>
-            <a:endParaRPr lang="en-US" dirty="0">
+            <a:endParaRPr lang="en-US" b="1" dirty="0">
               <a:latin typeface="Museo 100 Regular"/>
               <a:cs typeface="Museo 100 Regular"/>
             </a:endParaRPr>
@@ -3784,28 +3777,56 @@
       </p:sp>
       <p:pic>
         <p:nvPicPr>
-          <p:cNvPr id="5" name="Picture 4" descr="Arduino_DAY2018_Logotype.png"/>
+          <p:cNvPr id="4" name="Picture 3" descr="Arduino_DAY2019_Logotype.png"/>
           <p:cNvPicPr>
             <a:picLocks noChangeAspect="1"/>
           </p:cNvPicPr>
           <p:nvPr/>
         </p:nvPicPr>
         <p:blipFill rotWithShape="1">
-          <a:blip r:embed="rId3" cstate="email">
-            <a:alphaModFix/>
+          <a:blip r:embed="rId3">
             <a:extLst>
               <a:ext uri="{28A0092B-C50C-407E-A947-70E740481C1C}">
-                <a14:useLocalDpi xmlns:a14="http://schemas.microsoft.com/office/drawing/2010/main"/>
+                <a14:useLocalDpi xmlns:a14="http://schemas.microsoft.com/office/drawing/2010/main" val="0"/>
               </a:ext>
             </a:extLst>
           </a:blip>
-          <a:srcRect/>
+          <a:srcRect l="43332" t="24349"/>
           <a:stretch/>
         </p:blipFill>
         <p:spPr>
           <a:xfrm>
-            <a:off x="5856057" y="5305152"/>
-            <a:ext cx="3287943" cy="1552848"/>
+            <a:off x="-1" y="-1"/>
+            <a:ext cx="3677443" cy="2020875"/>
+          </a:xfrm>
+          <a:prstGeom prst="rect">
+            <a:avLst/>
+          </a:prstGeom>
+        </p:spPr>
+      </p:pic>
+      <p:pic>
+        <p:nvPicPr>
+          <p:cNvPr id="6" name="Picture 5" descr="Arduino_DAY2019_Logotype.png"/>
+          <p:cNvPicPr>
+            <a:picLocks noChangeAspect="1"/>
+          </p:cNvPicPr>
+          <p:nvPr/>
+        </p:nvPicPr>
+        <p:blipFill rotWithShape="1">
+          <a:blip r:embed="rId3">
+            <a:extLst>
+              <a:ext uri="{28A0092B-C50C-407E-A947-70E740481C1C}">
+                <a14:useLocalDpi xmlns:a14="http://schemas.microsoft.com/office/drawing/2010/main" val="0"/>
+              </a:ext>
+            </a:extLst>
+          </a:blip>
+          <a:srcRect r="67844" b="46534"/>
+          <a:stretch/>
+        </p:blipFill>
+        <p:spPr>
+          <a:xfrm>
+            <a:off x="6481823" y="5035927"/>
+            <a:ext cx="2662177" cy="1822073"/>
           </a:xfrm>
           <a:prstGeom prst="rect">
             <a:avLst/>
@@ -5340,6 +5361,124 @@
           <a:chExt cx="0" cy="0"/>
         </a:xfrm>
       </p:grpSpPr>
+      <p:pic>
+        <p:nvPicPr>
+          <p:cNvPr id="4" name="Picture 3"/>
+          <p:cNvPicPr>
+            <a:picLocks noChangeAspect="1"/>
+          </p:cNvPicPr>
+          <p:nvPr/>
+        </p:nvPicPr>
+        <p:blipFill>
+          <a:blip r:embed="rId2"/>
+          <a:stretch>
+            <a:fillRect/>
+          </a:stretch>
+        </p:blipFill>
+        <p:spPr>
+          <a:xfrm>
+            <a:off x="0" y="1196064"/>
+            <a:ext cx="9144000" cy="5951004"/>
+          </a:xfrm>
+          <a:prstGeom prst="rect">
+            <a:avLst/>
+          </a:prstGeom>
+        </p:spPr>
+      </p:pic>
+      <p:sp>
+        <p:nvSpPr>
+          <p:cNvPr id="6" name="Rectangle 5"/>
+          <p:cNvSpPr/>
+          <p:nvPr/>
+        </p:nvSpPr>
+        <p:spPr>
+          <a:xfrm>
+            <a:off x="1373827" y="527202"/>
+            <a:ext cx="6396346" cy="461665"/>
+          </a:xfrm>
+          <a:prstGeom prst="rect">
+            <a:avLst/>
+          </a:prstGeom>
+        </p:spPr>
+        <p:txBody>
+          <a:bodyPr wrap="square">
+            <a:spAutoFit/>
+          </a:bodyPr>
+          <a:lstStyle/>
+          <a:p>
+            <a:pPr algn="ctr"/>
+            <a:r>
+              <a:rPr lang="en-US" sz="2400" dirty="0">
+                <a:latin typeface="Museo 100 Regular"/>
+                <a:cs typeface="Museo 100 Regular"/>
+                <a:hlinkClick r:id="rId3"/>
+              </a:rPr>
+              <a:t>https://www.arduino.cc/en/reference/</a:t>
+            </a:r>
+            <a:r>
+              <a:rPr lang="en-US" sz="2400" dirty="0" smtClean="0">
+                <a:latin typeface="Museo 100 Regular"/>
+                <a:cs typeface="Museo 100 Regular"/>
+                <a:hlinkClick r:id="rId3"/>
+              </a:rPr>
+              <a:t>servo</a:t>
+            </a:r>
+            <a:endParaRPr lang="en-US" sz="2400" dirty="0">
+              <a:latin typeface="Museo 100 Regular"/>
+              <a:cs typeface="Museo 100 Regular"/>
+            </a:endParaRPr>
+          </a:p>
+        </p:txBody>
+      </p:sp>
+    </p:spTree>
+    <p:extLst>
+      <p:ext uri="{BB962C8B-B14F-4D97-AF65-F5344CB8AC3E}">
+        <p14:creationId xmlns:p14="http://schemas.microsoft.com/office/powerpoint/2010/main" val="934935192"/>
+      </p:ext>
+    </p:extLst>
+  </p:cSld>
+  <p:clrMapOvr>
+    <a:masterClrMapping/>
+  </p:clrMapOvr>
+  <mc:AlternateContent xmlns:mc="http://schemas.openxmlformats.org/markup-compatibility/2006" xmlns:p14="http://schemas.microsoft.com/office/powerpoint/2010/main">
+    <mc:Choice Requires="p14">
+      <p:transition p14:dur="400">
+        <p:push dir="u"/>
+      </p:transition>
+    </mc:Choice>
+    <mc:Fallback xmlns="">
+      <p:transition xmlns:p14="http://schemas.microsoft.com/office/powerpoint/2010/main">
+        <p:push dir="u"/>
+      </p:transition>
+    </mc:Fallback>
+  </mc:AlternateContent>
+  <p:timing>
+    <p:tnLst>
+      <p:par>
+        <p:cTn xmlns:p14="http://schemas.microsoft.com/office/powerpoint/2010/main" id="1" dur="indefinite" restart="never" nodeType="tmRoot"/>
+      </p:par>
+    </p:tnLst>
+  </p:timing>
+</p:sld>
+</file>
+
+<file path=ppt/slides/slide22.xml><?xml version="1.0" encoding="utf-8"?>
+<p:sld xmlns:a="http://schemas.openxmlformats.org/drawingml/2006/main" xmlns:r="http://schemas.openxmlformats.org/officeDocument/2006/relationships" xmlns:p="http://schemas.openxmlformats.org/presentationml/2006/main">
+  <p:cSld>
+    <p:spTree>
+      <p:nvGrpSpPr>
+        <p:cNvPr id="1" name=""/>
+        <p:cNvGrpSpPr/>
+        <p:nvPr/>
+      </p:nvGrpSpPr>
+      <p:grpSpPr>
+        <a:xfrm>
+          <a:off x="0" y="0"/>
+          <a:ext cx="0" cy="0"/>
+          <a:chOff x="0" y="0"/>
+          <a:chExt cx="0" cy="0"/>
+        </a:xfrm>
+      </p:grpSpPr>
       <p:sp>
         <p:nvSpPr>
           <p:cNvPr id="2" name="Title 1"/>
@@ -5444,7 +5583,7 @@
 </p:sld>
 </file>
 
-<file path=ppt/slides/slide22.xml><?xml version="1.0" encoding="utf-8"?>
+<file path=ppt/slides/slide23.xml><?xml version="1.0" encoding="utf-8"?>
 <p:sld xmlns:a="http://schemas.openxmlformats.org/drawingml/2006/main" xmlns:r="http://schemas.openxmlformats.org/officeDocument/2006/relationships" xmlns:p="http://schemas.openxmlformats.org/presentationml/2006/main">
   <p:cSld>
     <p:spTree>
@@ -5561,7 +5700,7 @@
 </p:sld>
 </file>
 
-<file path=ppt/slides/slide23.xml><?xml version="1.0" encoding="utf-8"?>
+<file path=ppt/slides/slide24.xml><?xml version="1.0" encoding="utf-8"?>
 <p:sld xmlns:a="http://schemas.openxmlformats.org/drawingml/2006/main" xmlns:r="http://schemas.openxmlformats.org/officeDocument/2006/relationships" xmlns:p="http://schemas.openxmlformats.org/presentationml/2006/main">
   <p:cSld>
     <p:spTree>
@@ -5682,7 +5821,7 @@
 </p:sld>
 </file>
 
-<file path=ppt/slides/slide24.xml><?xml version="1.0" encoding="utf-8"?>
+<file path=ppt/slides/slide25.xml><?xml version="1.0" encoding="utf-8"?>
 <p:sld xmlns:a="http://schemas.openxmlformats.org/drawingml/2006/main" xmlns:r="http://schemas.openxmlformats.org/officeDocument/2006/relationships" xmlns:p="http://schemas.openxmlformats.org/presentationml/2006/main">
   <p:cSld>
     <p:spTree>
@@ -5803,7 +5942,7 @@
 </p:sld>
 </file>
 
-<file path=ppt/slides/slide25.xml><?xml version="1.0" encoding="utf-8"?>
+<file path=ppt/slides/slide26.xml><?xml version="1.0" encoding="utf-8"?>
 <p:sld xmlns:a="http://schemas.openxmlformats.org/drawingml/2006/main" xmlns:r="http://schemas.openxmlformats.org/officeDocument/2006/relationships" xmlns:p="http://schemas.openxmlformats.org/presentationml/2006/main">
   <p:cSld>
     <p:spTree>
@@ -5927,7 +6066,125 @@
 </p:sld>
 </file>
 
-<file path=ppt/slides/slide26.xml><?xml version="1.0" encoding="utf-8"?>
+<file path=ppt/slides/slide27.xml><?xml version="1.0" encoding="utf-8"?>
+<p:sld xmlns:a="http://schemas.openxmlformats.org/drawingml/2006/main" xmlns:r="http://schemas.openxmlformats.org/officeDocument/2006/relationships" xmlns:p="http://schemas.openxmlformats.org/presentationml/2006/main">
+  <p:cSld>
+    <p:spTree>
+      <p:nvGrpSpPr>
+        <p:cNvPr id="1" name=""/>
+        <p:cNvGrpSpPr/>
+        <p:nvPr/>
+      </p:nvGrpSpPr>
+      <p:grpSpPr>
+        <a:xfrm>
+          <a:off x="0" y="0"/>
+          <a:ext cx="0" cy="0"/>
+          <a:chOff x="0" y="0"/>
+          <a:chExt cx="0" cy="0"/>
+        </a:xfrm>
+      </p:grpSpPr>
+      <p:pic>
+        <p:nvPicPr>
+          <p:cNvPr id="3" name="Picture 2"/>
+          <p:cNvPicPr>
+            <a:picLocks noChangeAspect="1"/>
+          </p:cNvPicPr>
+          <p:nvPr/>
+        </p:nvPicPr>
+        <p:blipFill>
+          <a:blip r:embed="rId2"/>
+          <a:stretch>
+            <a:fillRect/>
+          </a:stretch>
+        </p:blipFill>
+        <p:spPr>
+          <a:xfrm>
+            <a:off x="0" y="1299983"/>
+            <a:ext cx="9144000" cy="5994400"/>
+          </a:xfrm>
+          <a:prstGeom prst="rect">
+            <a:avLst/>
+          </a:prstGeom>
+        </p:spPr>
+      </p:pic>
+      <p:sp>
+        <p:nvSpPr>
+          <p:cNvPr id="6" name="Rectangle 5"/>
+          <p:cNvSpPr/>
+          <p:nvPr/>
+        </p:nvSpPr>
+        <p:spPr>
+          <a:xfrm>
+            <a:off x="872284" y="630865"/>
+            <a:ext cx="7399432" cy="461665"/>
+          </a:xfrm>
+          <a:prstGeom prst="rect">
+            <a:avLst/>
+          </a:prstGeom>
+        </p:spPr>
+        <p:txBody>
+          <a:bodyPr wrap="square">
+            <a:spAutoFit/>
+          </a:bodyPr>
+          <a:lstStyle/>
+          <a:p>
+            <a:pPr algn="ctr"/>
+            <a:r>
+              <a:rPr lang="en-US" sz="2400" dirty="0">
+                <a:latin typeface="Museo 100 Regular"/>
+                <a:cs typeface="Museo 100 Regular"/>
+                <a:hlinkClick r:id="rId3"/>
+              </a:rPr>
+              <a:t>https://www.arduino.cc/en/Reference/</a:t>
+            </a:r>
+            <a:r>
+              <a:rPr lang="en-US" sz="2400" dirty="0" smtClean="0">
+                <a:latin typeface="Museo 100 Regular"/>
+                <a:cs typeface="Museo 100 Regular"/>
+                <a:hlinkClick r:id="rId3"/>
+              </a:rPr>
+              <a:t>LiquidCrystal</a:t>
+            </a:r>
+            <a:endParaRPr lang="en-US" sz="2400" dirty="0">
+              <a:latin typeface="Museo 100 Regular"/>
+              <a:cs typeface="Museo 100 Regular"/>
+            </a:endParaRPr>
+          </a:p>
+        </p:txBody>
+      </p:sp>
+    </p:spTree>
+    <p:extLst>
+      <p:ext uri="{BB962C8B-B14F-4D97-AF65-F5344CB8AC3E}">
+        <p14:creationId xmlns:p14="http://schemas.microsoft.com/office/powerpoint/2010/main" val="3883260021"/>
+      </p:ext>
+    </p:extLst>
+  </p:cSld>
+  <p:clrMapOvr>
+    <a:masterClrMapping/>
+  </p:clrMapOvr>
+  <mc:AlternateContent xmlns:mc="http://schemas.openxmlformats.org/markup-compatibility/2006" xmlns:p14="http://schemas.microsoft.com/office/powerpoint/2010/main">
+    <mc:Choice Requires="p14">
+      <p:transition p14:dur="400">
+        <p:push dir="u"/>
+      </p:transition>
+    </mc:Choice>
+    <mc:Fallback xmlns="">
+      <p:transition xmlns:p14="http://schemas.microsoft.com/office/powerpoint/2010/main">
+        <p:push dir="u"/>
+      </p:transition>
+    </mc:Fallback>
+  </mc:AlternateContent>
+  <p:timing>
+    <p:tnLst>
+      <p:par>
+        <p:cTn xmlns:p14="http://schemas.microsoft.com/office/powerpoint/2010/main" id="1" dur="indefinite" restart="never" nodeType="tmRoot"/>
+      </p:par>
+    </p:tnLst>
+  </p:timing>
+</p:sld>
+</file>
+
+<file path=ppt/slides/slide28.xml><?xml version="1.0" encoding="utf-8"?>
 <p:sld xmlns:a="http://schemas.openxmlformats.org/drawingml/2006/main" xmlns:r="http://schemas.openxmlformats.org/officeDocument/2006/relationships" xmlns:p="http://schemas.openxmlformats.org/presentationml/2006/main">
   <p:cSld>
     <p:spTree>
@@ -6055,7 +6312,7 @@
 </p:sld>
 </file>
 
-<file path=ppt/slides/slide27.xml><?xml version="1.0" encoding="utf-8"?>
+<file path=ppt/slides/slide29.xml><?xml version="1.0" encoding="utf-8"?>
 <p:sld xmlns:a="http://schemas.openxmlformats.org/drawingml/2006/main" xmlns:r="http://schemas.openxmlformats.org/officeDocument/2006/relationships" xmlns:p="http://schemas.openxmlformats.org/presentationml/2006/main">
   <p:cSld>
     <p:spTree>
@@ -6113,7 +6370,7 @@
         </p:nvSpPr>
         <p:spPr>
           <a:xfrm>
-            <a:off x="457200" y="1252481"/>
+            <a:off x="457200" y="1511641"/>
             <a:ext cx="8229600" cy="5047233"/>
           </a:xfrm>
         </p:spPr>
@@ -6124,7 +6381,7 @@
           <a:lstStyle/>
           <a:p>
             <a:r>
-              <a:rPr lang="en-US" sz="2200" dirty="0">
+              <a:rPr lang="en-US" sz="2800" dirty="0">
                 <a:latin typeface="Museo 100 Regular"/>
                 <a:cs typeface="Museo 100 Regular"/>
                 <a:hlinkClick r:id="rId2"/>
@@ -6132,21 +6389,21 @@
               <a:t>https://</a:t>
             </a:r>
             <a:r>
-              <a:rPr lang="en-US" sz="2200" dirty="0" smtClean="0">
+              <a:rPr lang="en-US" sz="2800" dirty="0" smtClean="0">
                 <a:latin typeface="Museo 100 Regular"/>
                 <a:cs typeface="Museo 100 Regular"/>
                 <a:hlinkClick r:id="rId2"/>
               </a:rPr>
               <a:t>www.arduino.cc</a:t>
             </a:r>
-            <a:endParaRPr lang="en-US" sz="2200" dirty="0" smtClean="0">
+            <a:endParaRPr lang="en-US" sz="2800" dirty="0" smtClean="0">
               <a:latin typeface="Museo 100 Regular"/>
               <a:cs typeface="Museo 100 Regular"/>
             </a:endParaRPr>
           </a:p>
           <a:p>
             <a:r>
-              <a:rPr lang="en-US" sz="2200" dirty="0">
+              <a:rPr lang="en-US" sz="2800" dirty="0">
                 <a:latin typeface="Museo 100 Regular"/>
                 <a:cs typeface="Museo 100 Regular"/>
                 <a:hlinkClick r:id="rId3"/>
@@ -6154,21 +6411,21 @@
               <a:t>https://www.arduino.cc/reference/</a:t>
             </a:r>
             <a:r>
-              <a:rPr lang="en-US" sz="2200" dirty="0" smtClean="0">
+              <a:rPr lang="en-US" sz="2800" dirty="0" smtClean="0">
                 <a:latin typeface="Museo 100 Regular"/>
                 <a:cs typeface="Museo 100 Regular"/>
                 <a:hlinkClick r:id="rId3"/>
               </a:rPr>
               <a:t>en</a:t>
             </a:r>
-            <a:endParaRPr lang="en-US" sz="2200" dirty="0">
+            <a:endParaRPr lang="en-US" sz="2800" dirty="0">
               <a:latin typeface="Museo 100 Regular"/>
               <a:cs typeface="Museo 100 Regular"/>
             </a:endParaRPr>
           </a:p>
           <a:p>
             <a:r>
-              <a:rPr lang="en-US" sz="2200" dirty="0" smtClean="0">
+              <a:rPr lang="en-US" sz="2800" dirty="0" smtClean="0">
                 <a:latin typeface="Museo 100 Regular"/>
                 <a:cs typeface="Museo 100 Regular"/>
                 <a:hlinkClick r:id="rId4"/>
@@ -6176,7 +6433,7 @@
               <a:t>https</a:t>
             </a:r>
             <a:r>
-              <a:rPr lang="en-US" sz="2200" dirty="0">
+              <a:rPr lang="en-US" sz="2800" dirty="0">
                 <a:latin typeface="Museo 100 Regular"/>
                 <a:cs typeface="Museo 100 Regular"/>
                 <a:hlinkClick r:id="rId4"/>
@@ -6184,21 +6441,21 @@
               <a:t>://</a:t>
             </a:r>
             <a:r>
-              <a:rPr lang="en-US" sz="2200" dirty="0" smtClean="0">
+              <a:rPr lang="en-US" sz="2800" dirty="0" smtClean="0">
                 <a:latin typeface="Museo 100 Regular"/>
                 <a:cs typeface="Museo 100 Regular"/>
                 <a:hlinkClick r:id="rId4"/>
               </a:rPr>
               <a:t>www.tinkercad.com</a:t>
             </a:r>
-            <a:endParaRPr lang="en-US" sz="2200" dirty="0" smtClean="0">
+            <a:endParaRPr lang="en-US" sz="2800" dirty="0" smtClean="0">
               <a:latin typeface="Museo 100 Regular"/>
               <a:cs typeface="Museo 100 Regular"/>
             </a:endParaRPr>
           </a:p>
           <a:p>
             <a:r>
-              <a:rPr lang="en-US" sz="2200" dirty="0">
+              <a:rPr lang="en-US" sz="2800" dirty="0">
                 <a:latin typeface="Museo 100 Regular"/>
                 <a:cs typeface="Museo 100 Regular"/>
                 <a:hlinkClick r:id="rId5"/>
@@ -6206,21 +6463,21 @@
               <a:t>https://youtu.be/</a:t>
             </a:r>
             <a:r>
-              <a:rPr lang="en-US" sz="2200" dirty="0" smtClean="0">
+              <a:rPr lang="en-US" sz="2800" dirty="0" smtClean="0">
                 <a:latin typeface="Museo 100 Regular"/>
                 <a:cs typeface="Museo 100 Regular"/>
                 <a:hlinkClick r:id="rId5"/>
               </a:rPr>
               <a:t>WynYhZx_qds</a:t>
             </a:r>
-            <a:endParaRPr lang="en-US" sz="2200" dirty="0">
+            <a:endParaRPr lang="en-US" sz="2800" dirty="0">
               <a:latin typeface="Museo 100 Regular"/>
               <a:cs typeface="Museo 100 Regular"/>
             </a:endParaRPr>
           </a:p>
           <a:p>
             <a:r>
-              <a:rPr lang="en-US" sz="2200" dirty="0" smtClean="0">
+              <a:rPr lang="en-US" sz="2800" dirty="0" smtClean="0">
                 <a:latin typeface="Museo 100 Regular"/>
                 <a:cs typeface="Museo 100 Regular"/>
                 <a:hlinkClick r:id="rId6"/>
@@ -6228,7 +6485,7 @@
               <a:t>https</a:t>
             </a:r>
             <a:r>
-              <a:rPr lang="en-US" sz="2200" dirty="0">
+              <a:rPr lang="en-US" sz="2800" dirty="0">
                 <a:latin typeface="Museo 100 Regular"/>
                 <a:cs typeface="Museo 100 Regular"/>
                 <a:hlinkClick r:id="rId6"/>
@@ -6236,21 +6493,21 @@
               <a:t>://www.arduino.cc/en/Tutorial/</a:t>
             </a:r>
             <a:r>
-              <a:rPr lang="en-US" sz="2200" dirty="0" smtClean="0">
+              <a:rPr lang="en-US" sz="2800" dirty="0" smtClean="0">
                 <a:latin typeface="Museo 100 Regular"/>
                 <a:cs typeface="Museo 100 Regular"/>
                 <a:hlinkClick r:id="rId6"/>
               </a:rPr>
               <a:t>Knob</a:t>
             </a:r>
-            <a:endParaRPr lang="en-US" sz="2200" dirty="0" smtClean="0">
+            <a:endParaRPr lang="en-US" sz="2800" dirty="0" smtClean="0">
               <a:latin typeface="Museo 100 Regular"/>
               <a:cs typeface="Museo 100 Regular"/>
             </a:endParaRPr>
           </a:p>
           <a:p>
             <a:r>
-              <a:rPr lang="en-US" sz="2200" dirty="0" smtClean="0">
+              <a:rPr lang="en-US" sz="2800" dirty="0" smtClean="0">
                 <a:latin typeface="Museo 100 Regular"/>
                 <a:cs typeface="Museo 100 Regular"/>
                 <a:hlinkClick r:id="rId7"/>
@@ -6258,7 +6515,7 @@
               <a:t>http</a:t>
             </a:r>
             <a:r>
-              <a:rPr lang="en-US" sz="2200" dirty="0">
+              <a:rPr lang="en-US" sz="2800" dirty="0">
                 <a:latin typeface="Museo 100 Regular"/>
                 <a:cs typeface="Museo 100 Regular"/>
                 <a:hlinkClick r:id="rId7"/>
@@ -6266,21 +6523,21 @@
               <a:t>://www.arduino.cc/en/Tutorial/</a:t>
             </a:r>
             <a:r>
-              <a:rPr lang="en-US" sz="2200" dirty="0" smtClean="0">
+              <a:rPr lang="en-US" sz="2800" dirty="0" smtClean="0">
                 <a:latin typeface="Museo 100 Regular"/>
                 <a:cs typeface="Museo 100 Regular"/>
                 <a:hlinkClick r:id="rId7"/>
               </a:rPr>
               <a:t>Ping</a:t>
             </a:r>
-            <a:endParaRPr lang="en-US" sz="2200" dirty="0" smtClean="0">
+            <a:endParaRPr lang="en-US" sz="2800" dirty="0" smtClean="0">
               <a:latin typeface="Museo 100 Regular"/>
               <a:cs typeface="Museo 100 Regular"/>
             </a:endParaRPr>
           </a:p>
           <a:p>
             <a:r>
-              <a:rPr lang="en-US" sz="2200" dirty="0">
+              <a:rPr lang="en-US" sz="2800" dirty="0">
                 <a:latin typeface="Museo 100 Regular"/>
                 <a:cs typeface="Museo 100 Regular"/>
                 <a:hlinkClick r:id="rId8"/>
@@ -6288,32 +6545,32 @@
               <a:t>http://www.arduino.cc/en/Tutorial/</a:t>
             </a:r>
             <a:r>
-              <a:rPr lang="en-US" sz="2200" dirty="0" smtClean="0">
+              <a:rPr lang="en-US" sz="2800" dirty="0" smtClean="0">
                 <a:latin typeface="Museo 100 Regular"/>
                 <a:cs typeface="Museo 100 Regular"/>
                 <a:hlinkClick r:id="rId8"/>
               </a:rPr>
               <a:t>LiquidCrystal</a:t>
             </a:r>
-            <a:endParaRPr lang="en-US" sz="2200" dirty="0" smtClean="0">
+            <a:endParaRPr lang="en-US" sz="2800" dirty="0" smtClean="0">
               <a:latin typeface="Museo 100 Regular"/>
               <a:cs typeface="Museo 100 Regular"/>
             </a:endParaRPr>
           </a:p>
           <a:p>
-            <a:endParaRPr lang="en-US" sz="2200" dirty="0" smtClean="0">
+            <a:endParaRPr lang="en-US" sz="2800" dirty="0" smtClean="0">
               <a:latin typeface="Museo 100 Regular"/>
               <a:cs typeface="Museo 100 Regular"/>
             </a:endParaRPr>
           </a:p>
           <a:p>
-            <a:endParaRPr lang="en-US" sz="2200" dirty="0" smtClean="0">
+            <a:endParaRPr lang="en-US" sz="2800" dirty="0" smtClean="0">
               <a:latin typeface="Museo 100 Regular"/>
               <a:cs typeface="Museo 100 Regular"/>
             </a:endParaRPr>
           </a:p>
           <a:p>
-            <a:endParaRPr lang="en-US" sz="2200" dirty="0" smtClean="0">
+            <a:endParaRPr lang="en-US" sz="2800" dirty="0" smtClean="0">
               <a:latin typeface="Museo 100 Regular"/>
               <a:cs typeface="Museo 100 Regular"/>
             </a:endParaRPr>
@@ -6324,137 +6581,6 @@
     <p:extLst>
       <p:ext uri="{BB962C8B-B14F-4D97-AF65-F5344CB8AC3E}">
         <p14:creationId xmlns:p14="http://schemas.microsoft.com/office/powerpoint/2010/main" val="2102470656"/>
-      </p:ext>
-    </p:extLst>
-  </p:cSld>
-  <p:clrMapOvr>
-    <a:masterClrMapping/>
-  </p:clrMapOvr>
-  <mc:AlternateContent xmlns:mc="http://schemas.openxmlformats.org/markup-compatibility/2006" xmlns:p14="http://schemas.microsoft.com/office/powerpoint/2010/main">
-    <mc:Choice Requires="p14">
-      <p:transition p14:dur="400">
-        <p:push dir="u"/>
-      </p:transition>
-    </mc:Choice>
-    <mc:Fallback xmlns="">
-      <p:transition xmlns:p14="http://schemas.microsoft.com/office/powerpoint/2010/main">
-        <p:push dir="u"/>
-      </p:transition>
-    </mc:Fallback>
-  </mc:AlternateContent>
-  <p:timing>
-    <p:tnLst>
-      <p:par>
-        <p:cTn xmlns:p14="http://schemas.microsoft.com/office/powerpoint/2010/main" id="1" dur="indefinite" restart="never" nodeType="tmRoot"/>
-      </p:par>
-    </p:tnLst>
-  </p:timing>
-</p:sld>
-</file>
-
-<file path=ppt/slides/slide28.xml><?xml version="1.0" encoding="utf-8"?>
-<p:sld xmlns:a="http://schemas.openxmlformats.org/drawingml/2006/main" xmlns:r="http://schemas.openxmlformats.org/officeDocument/2006/relationships" xmlns:p="http://schemas.openxmlformats.org/presentationml/2006/main">
-  <p:cSld>
-    <p:spTree>
-      <p:nvGrpSpPr>
-        <p:cNvPr id="1" name=""/>
-        <p:cNvGrpSpPr/>
-        <p:nvPr/>
-      </p:nvGrpSpPr>
-      <p:grpSpPr>
-        <a:xfrm>
-          <a:off x="0" y="0"/>
-          <a:ext cx="0" cy="0"/>
-          <a:chOff x="0" y="0"/>
-          <a:chExt cx="0" cy="0"/>
-        </a:xfrm>
-      </p:grpSpPr>
-      <p:sp>
-        <p:nvSpPr>
-          <p:cNvPr id="2" name="Rectangle 1"/>
-          <p:cNvSpPr/>
-          <p:nvPr/>
-        </p:nvSpPr>
-        <p:spPr>
-          <a:xfrm>
-            <a:off x="1524531" y="915609"/>
-            <a:ext cx="5259114" cy="584776"/>
-          </a:xfrm>
-          <a:prstGeom prst="rect">
-            <a:avLst/>
-          </a:prstGeom>
-        </p:spPr>
-        <p:txBody>
-          <a:bodyPr wrap="none">
-            <a:spAutoFit/>
-          </a:bodyPr>
-          <a:lstStyle/>
-          <a:p>
-            <a:r>
-              <a:rPr lang="en-US" sz="3200" dirty="0" smtClean="0">
-                <a:latin typeface="Museo 100 Regular"/>
-                <a:cs typeface="Museo 100 Regular"/>
-                <a:hlinkClick r:id="rId2" action="ppaction://hlinkfile"/>
-              </a:rPr>
-              <a:t>github.com</a:t>
-            </a:r>
-            <a:r>
-              <a:rPr lang="en-US" sz="3200" dirty="0">
-                <a:latin typeface="Museo 100 Regular"/>
-                <a:cs typeface="Museo 100 Regular"/>
-                <a:hlinkClick r:id="rId2" action="ppaction://hlinkfile"/>
-              </a:rPr>
-              <a:t>/fkuhne/</a:t>
-            </a:r>
-            <a:r>
-              <a:rPr lang="en-US" sz="3200" dirty="0" smtClean="0">
-                <a:latin typeface="Museo 100 Regular"/>
-                <a:cs typeface="Museo 100 Regular"/>
-                <a:hlinkClick r:id="rId2" action="ppaction://hlinkfile"/>
-              </a:rPr>
-              <a:t>aday19</a:t>
-            </a:r>
-            <a:endParaRPr lang="en-US" sz="3200" dirty="0" smtClean="0">
-              <a:latin typeface="Museo 100 Regular"/>
-              <a:cs typeface="Museo 100 Regular"/>
-            </a:endParaRPr>
-          </a:p>
-        </p:txBody>
-      </p:sp>
-      <p:pic>
-        <p:nvPicPr>
-          <p:cNvPr id="4" name="Picture 3" descr="frame.png"/>
-          <p:cNvPicPr>
-            <a:picLocks noChangeAspect="1"/>
-          </p:cNvPicPr>
-          <p:nvPr/>
-        </p:nvPicPr>
-        <p:blipFill>
-          <a:blip r:embed="rId3">
-            <a:extLst>
-              <a:ext uri="{28A0092B-C50C-407E-A947-70E740481C1C}">
-                <a14:useLocalDpi xmlns:a14="http://schemas.microsoft.com/office/drawing/2010/main" val="0"/>
-              </a:ext>
-            </a:extLst>
-          </a:blip>
-          <a:stretch>
-            <a:fillRect/>
-          </a:stretch>
-        </p:blipFill>
-        <p:spPr>
-          <a:xfrm>
-            <a:off x="2667000" y="1601748"/>
-            <a:ext cx="3810000" cy="3810000"/>
-          </a:xfrm>
-          <a:prstGeom prst="rect">
-            <a:avLst/>
-          </a:prstGeom>
-        </p:spPr>
-      </p:pic>
-    </p:spTree>
-    <p:extLst>
-      <p:ext uri="{BB962C8B-B14F-4D97-AF65-F5344CB8AC3E}">
-        <p14:creationId xmlns:p14="http://schemas.microsoft.com/office/powerpoint/2010/main" val="2379213960"/>
       </p:ext>
     </p:extLst>
   </p:cSld>
@@ -6579,6 +6705,217 @@
     <p:extLst>
       <p:ext uri="{BB962C8B-B14F-4D97-AF65-F5344CB8AC3E}">
         <p14:creationId xmlns:p14="http://schemas.microsoft.com/office/powerpoint/2010/main" val="2410288382"/>
+      </p:ext>
+    </p:extLst>
+  </p:cSld>
+  <p:clrMapOvr>
+    <a:masterClrMapping/>
+  </p:clrMapOvr>
+  <mc:AlternateContent xmlns:mc="http://schemas.openxmlformats.org/markup-compatibility/2006" xmlns:p14="http://schemas.microsoft.com/office/powerpoint/2010/main">
+    <mc:Choice Requires="p14">
+      <p:transition p14:dur="400">
+        <p:push dir="u"/>
+      </p:transition>
+    </mc:Choice>
+    <mc:Fallback xmlns="">
+      <p:transition xmlns:p14="http://schemas.microsoft.com/office/powerpoint/2010/main">
+        <p:push dir="u"/>
+      </p:transition>
+    </mc:Fallback>
+  </mc:AlternateContent>
+  <p:timing>
+    <p:tnLst>
+      <p:par>
+        <p:cTn xmlns:p14="http://schemas.microsoft.com/office/powerpoint/2010/main" id="1" dur="indefinite" restart="never" nodeType="tmRoot"/>
+      </p:par>
+    </p:tnLst>
+  </p:timing>
+</p:sld>
+</file>
+
+<file path=ppt/slides/slide30.xml><?xml version="1.0" encoding="utf-8"?>
+<p:sld xmlns:a="http://schemas.openxmlformats.org/drawingml/2006/main" xmlns:r="http://schemas.openxmlformats.org/officeDocument/2006/relationships" xmlns:p="http://schemas.openxmlformats.org/presentationml/2006/main">
+  <p:cSld>
+    <p:spTree>
+      <p:nvGrpSpPr>
+        <p:cNvPr id="1" name=""/>
+        <p:cNvGrpSpPr/>
+        <p:nvPr/>
+      </p:nvGrpSpPr>
+      <p:grpSpPr>
+        <a:xfrm>
+          <a:off x="0" y="0"/>
+          <a:ext cx="0" cy="0"/>
+          <a:chOff x="0" y="0"/>
+          <a:chExt cx="0" cy="0"/>
+        </a:xfrm>
+      </p:grpSpPr>
+      <p:pic>
+        <p:nvPicPr>
+          <p:cNvPr id="4" name="Picture 3" descr="frame.png"/>
+          <p:cNvPicPr>
+            <a:picLocks noChangeAspect="1"/>
+          </p:cNvPicPr>
+          <p:nvPr/>
+        </p:nvPicPr>
+        <p:blipFill>
+          <a:blip r:embed="rId2">
+            <a:extLst>
+              <a:ext uri="{28A0092B-C50C-407E-A947-70E740481C1C}">
+                <a14:useLocalDpi xmlns:a14="http://schemas.microsoft.com/office/drawing/2010/main" val="0"/>
+              </a:ext>
+            </a:extLst>
+          </a:blip>
+          <a:stretch>
+            <a:fillRect/>
+          </a:stretch>
+        </p:blipFill>
+        <p:spPr>
+          <a:xfrm>
+            <a:off x="5334000" y="2588683"/>
+            <a:ext cx="3810000" cy="3810000"/>
+          </a:xfrm>
+          <a:prstGeom prst="rect">
+            <a:avLst/>
+          </a:prstGeom>
+        </p:spPr>
+      </p:pic>
+      <p:sp>
+        <p:nvSpPr>
+          <p:cNvPr id="2" name="Rectangle 1"/>
+          <p:cNvSpPr/>
+          <p:nvPr/>
+        </p:nvSpPr>
+        <p:spPr>
+          <a:xfrm>
+            <a:off x="3724055" y="6106295"/>
+            <a:ext cx="5259114" cy="584776"/>
+          </a:xfrm>
+          <a:prstGeom prst="rect">
+            <a:avLst/>
+          </a:prstGeom>
+        </p:spPr>
+        <p:txBody>
+          <a:bodyPr wrap="none">
+            <a:spAutoFit/>
+          </a:bodyPr>
+          <a:lstStyle/>
+          <a:p>
+            <a:pPr algn="ctr"/>
+            <a:r>
+              <a:rPr lang="en-US" sz="3200" dirty="0" smtClean="0">
+                <a:latin typeface="Museo 100 Regular"/>
+                <a:cs typeface="Museo 100 Regular"/>
+                <a:hlinkClick r:id="rId3" action="ppaction://hlinkfile"/>
+              </a:rPr>
+              <a:t>github.com</a:t>
+            </a:r>
+            <a:r>
+              <a:rPr lang="en-US" sz="3200" dirty="0">
+                <a:latin typeface="Museo 100 Regular"/>
+                <a:cs typeface="Museo 100 Regular"/>
+                <a:hlinkClick r:id="rId3" action="ppaction://hlinkfile"/>
+              </a:rPr>
+              <a:t>/fkuhne/</a:t>
+            </a:r>
+            <a:r>
+              <a:rPr lang="en-US" sz="3200" dirty="0" smtClean="0">
+                <a:latin typeface="Museo 100 Regular"/>
+                <a:cs typeface="Museo 100 Regular"/>
+                <a:hlinkClick r:id="rId3" action="ppaction://hlinkfile"/>
+              </a:rPr>
+              <a:t>aday19</a:t>
+            </a:r>
+            <a:endParaRPr lang="en-US" sz="3200" dirty="0" smtClean="0">
+              <a:latin typeface="Museo 100 Regular"/>
+              <a:cs typeface="Museo 100 Regular"/>
+            </a:endParaRPr>
+          </a:p>
+        </p:txBody>
+      </p:sp>
+      <p:sp>
+        <p:nvSpPr>
+          <p:cNvPr id="3" name="TextBox 2"/>
+          <p:cNvSpPr txBox="1"/>
+          <p:nvPr/>
+        </p:nvSpPr>
+        <p:spPr>
+          <a:xfrm>
+            <a:off x="401720" y="310991"/>
+            <a:ext cx="3952875" cy="2677656"/>
+          </a:xfrm>
+          <a:prstGeom prst="rect">
+            <a:avLst/>
+          </a:prstGeom>
+          <a:noFill/>
+        </p:spPr>
+        <p:txBody>
+          <a:bodyPr wrap="none" rtlCol="0">
+            <a:spAutoFit/>
+          </a:bodyPr>
+          <a:lstStyle/>
+          <a:p>
+            <a:r>
+              <a:rPr lang="en-US" sz="4800" b="1" dirty="0" smtClean="0">
+                <a:latin typeface="Museo 100 Regular"/>
+                <a:cs typeface="Museo 100 Regular"/>
+              </a:rPr>
+              <a:t>Obrigado!</a:t>
+            </a:r>
+          </a:p>
+          <a:p>
+            <a:endParaRPr lang="en-US" sz="4000" dirty="0" smtClean="0">
+              <a:latin typeface="Museo 100 Regular"/>
+              <a:cs typeface="Museo 100 Regular"/>
+            </a:endParaRPr>
+          </a:p>
+          <a:p>
+            <a:r>
+              <a:rPr lang="en-US" sz="4000" dirty="0" smtClean="0">
+                <a:latin typeface="Museo 100 Regular"/>
+                <a:cs typeface="Museo 100 Regular"/>
+              </a:rPr>
+              <a:t>Felipe </a:t>
+            </a:r>
+            <a:r>
+              <a:rPr lang="en-US" sz="4000" dirty="0" err="1" smtClean="0">
+                <a:latin typeface="Museo 100 Regular"/>
+                <a:cs typeface="Museo 100 Regular"/>
+              </a:rPr>
+              <a:t>K</a:t>
+            </a:r>
+            <a:r>
+              <a:rPr lang="en-US" sz="4000" dirty="0" err="1" smtClean="0">
+                <a:latin typeface="Museo 100 Regular"/>
+                <a:cs typeface="Museo 100 Regular"/>
+              </a:rPr>
+              <a:t>ühne</a:t>
+            </a:r>
+            <a:endParaRPr lang="en-US" sz="4000" dirty="0" smtClean="0">
+              <a:latin typeface="Museo 100 Regular"/>
+              <a:cs typeface="Museo 100 Regular"/>
+            </a:endParaRPr>
+          </a:p>
+          <a:p>
+            <a:r>
+              <a:rPr lang="en-US" sz="4000" dirty="0" smtClean="0">
+                <a:latin typeface="Museo 100 Regular"/>
+                <a:cs typeface="Museo 100 Regular"/>
+                <a:hlinkClick r:id="rId4"/>
+              </a:rPr>
+              <a:t>fkuhne@pucrs.br</a:t>
+            </a:r>
+            <a:endParaRPr lang="en-US" sz="4000" dirty="0">
+              <a:latin typeface="Museo 100 Regular"/>
+              <a:cs typeface="Museo 100 Regular"/>
+            </a:endParaRPr>
+          </a:p>
+        </p:txBody>
+      </p:sp>
+    </p:spTree>
+    <p:extLst>
+      <p:ext uri="{BB962C8B-B14F-4D97-AF65-F5344CB8AC3E}">
+        <p14:creationId xmlns:p14="http://schemas.microsoft.com/office/powerpoint/2010/main" val="3478143277"/>
       </p:ext>
     </p:extLst>
   </p:cSld>
@@ -7117,7 +7454,7 @@
 </file>
 
 <file path=ppt/slides/slide7.xml><?xml version="1.0" encoding="utf-8"?>
-<p:sld xmlns:a="http://schemas.openxmlformats.org/drawingml/2006/main" xmlns:r="http://schemas.openxmlformats.org/officeDocument/2006/relationships" xmlns:p="http://schemas.openxmlformats.org/presentationml/2006/main">
+<p:sld xmlns:a="http://schemas.openxmlformats.org/drawingml/2006/main" xmlns:r="http://schemas.openxmlformats.org/officeDocument/2006/relationships" xmlns:p="http://schemas.openxmlformats.org/presentationml/2006/main" show="0">
   <p:cSld>
     <p:spTree>
       <p:nvGrpSpPr>
@@ -7570,13 +7907,13 @@
   <p:clrMapOvr>
     <a:masterClrMapping/>
   </p:clrMapOvr>
-  <mc:AlternateContent xmlns:mc="http://schemas.openxmlformats.org/markup-compatibility/2006" xmlns:p14="http://schemas.microsoft.com/office/powerpoint/2010/main">
-    <mc:Choice Requires="p14">
+  <mc:AlternateContent xmlns:mc="http://schemas.openxmlformats.org/markup-compatibility/2006">
+    <mc:Choice xmlns:p14="http://schemas.microsoft.com/office/powerpoint/2010/main" Requires="p14">
       <p:transition p14:dur="400">
         <p:push dir="u"/>
       </p:transition>
     </mc:Choice>
-    <mc:Fallback xmlns="">
+    <mc:Fallback>
       <p:transition xmlns:p14="http://schemas.microsoft.com/office/powerpoint/2010/main">
         <p:push dir="u"/>
       </p:transition>

</xml_diff>